<commit_message>
adding cost management slide
</commit_message>
<xml_diff>
--- a/Document/Report/Presentation/OOPMS_Presentation_v1.0.pptx
+++ b/Document/Report/Presentation/OOPMS_Presentation_v1.0.pptx
@@ -5,7 +5,7 @@
     <p:sldMasterId id="2147483696" r:id="rId1"/>
   </p:sldMasterIdLst>
   <p:notesMasterIdLst>
-    <p:notesMasterId r:id="rId39"/>
+    <p:notesMasterId r:id="rId45"/>
   </p:notesMasterIdLst>
   <p:sldIdLst>
     <p:sldId id="258" r:id="rId2"/>
@@ -45,6 +45,12 @@
     <p:sldId id="288" r:id="rId36"/>
     <p:sldId id="289" r:id="rId37"/>
     <p:sldId id="290" r:id="rId38"/>
+    <p:sldId id="301" r:id="rId39"/>
+    <p:sldId id="303" r:id="rId40"/>
+    <p:sldId id="304" r:id="rId41"/>
+    <p:sldId id="305" r:id="rId42"/>
+    <p:sldId id="306" r:id="rId43"/>
+    <p:sldId id="307" r:id="rId44"/>
   </p:sldIdLst>
   <p:sldSz cx="9144000" cy="6858000" type="screen4x3"/>
   <p:notesSz cx="6858000" cy="9144000"/>
@@ -228,7 +234,7 @@
           <a:p>
             <a:fld id="{D5E9D448-0590-4949-815A-626CF08257EE}" type="datetimeFigureOut">
               <a:rPr lang="en-US" smtClean="0"/>
-              <a:t>8/19/2012</a:t>
+              <a:t>8/22/2012</a:t>
             </a:fld>
             <a:endParaRPr lang="en-US"/>
           </a:p>
@@ -921,7 +927,7 @@
           <a:p>
             <a:fld id="{0E6DFBB0-6CFE-4671-B8BE-710BB15F3BC9}" type="datetime1">
               <a:rPr lang="en-US" smtClean="0"/>
-              <a:t>8/19/2012</a:t>
+              <a:t>8/22/2012</a:t>
             </a:fld>
             <a:endParaRPr lang="en-US"/>
           </a:p>
@@ -1091,7 +1097,7 @@
           <a:p>
             <a:fld id="{AB989079-D6D7-44A4-B5B0-47464FBB368D}" type="datetime1">
               <a:rPr lang="en-US" smtClean="0"/>
-              <a:t>8/19/2012</a:t>
+              <a:t>8/22/2012</a:t>
             </a:fld>
             <a:endParaRPr lang="en-US"/>
           </a:p>
@@ -1271,7 +1277,7 @@
           <a:p>
             <a:fld id="{04445830-5C3B-4731-9AD7-690DE8DAA5F5}" type="datetime1">
               <a:rPr lang="en-US" smtClean="0"/>
-              <a:t>8/19/2012</a:t>
+              <a:t>8/22/2012</a:t>
             </a:fld>
             <a:endParaRPr lang="en-US"/>
           </a:p>
@@ -1441,7 +1447,7 @@
           <a:p>
             <a:fld id="{98FFAF04-EF5F-412C-8623-0998346429B6}" type="datetime1">
               <a:rPr lang="en-US" smtClean="0"/>
-              <a:t>8/19/2012</a:t>
+              <a:t>8/22/2012</a:t>
             </a:fld>
             <a:endParaRPr lang="en-US"/>
           </a:p>
@@ -1688,7 +1694,7 @@
           <a:p>
             <a:fld id="{E1B40072-8B3B-4F12-B317-92BB15729FC4}" type="datetime1">
               <a:rPr lang="en-US" smtClean="0"/>
-              <a:t>8/19/2012</a:t>
+              <a:t>8/22/2012</a:t>
             </a:fld>
             <a:endParaRPr lang="en-US"/>
           </a:p>
@@ -1957,7 +1963,7 @@
           <a:p>
             <a:fld id="{9FCE0532-A6E2-4967-8AE8-C69DC3F02652}" type="datetime1">
               <a:rPr lang="en-US" smtClean="0"/>
-              <a:t>8/19/2012</a:t>
+              <a:t>8/22/2012</a:t>
             </a:fld>
             <a:endParaRPr lang="en-US"/>
           </a:p>
@@ -2340,7 +2346,7 @@
           <a:p>
             <a:fld id="{ED7E3711-C364-4C73-B4A8-72C0A11B9444}" type="datetime1">
               <a:rPr lang="en-US" smtClean="0"/>
-              <a:t>8/19/2012</a:t>
+              <a:t>8/22/2012</a:t>
             </a:fld>
             <a:endParaRPr lang="en-US"/>
           </a:p>
@@ -2495,7 +2501,7 @@
           <a:p>
             <a:fld id="{810E849C-AF3E-48A7-8729-C724250D5BB4}" type="datetime1">
               <a:rPr lang="en-US" smtClean="0"/>
-              <a:t>8/19/2012</a:t>
+              <a:t>8/22/2012</a:t>
             </a:fld>
             <a:endParaRPr lang="en-US"/>
           </a:p>
@@ -2590,7 +2596,7 @@
           <a:p>
             <a:fld id="{210E6CAB-84E4-4011-B107-EDB46785E0BF}" type="datetime1">
               <a:rPr lang="en-US" smtClean="0"/>
-              <a:t>8/19/2012</a:t>
+              <a:t>8/22/2012</a:t>
             </a:fld>
             <a:endParaRPr lang="en-US"/>
           </a:p>
@@ -2856,7 +2862,7 @@
           <a:p>
             <a:fld id="{D4C654D8-ED84-4FD2-9681-B79DDB18AEE7}" type="datetime1">
               <a:rPr lang="en-US" smtClean="0"/>
-              <a:t>8/19/2012</a:t>
+              <a:t>8/22/2012</a:t>
             </a:fld>
             <a:endParaRPr lang="en-US"/>
           </a:p>
@@ -3149,7 +3155,7 @@
           <a:p>
             <a:fld id="{442D0D88-E502-4C93-8C04-BB3D21395536}" type="datetime1">
               <a:rPr lang="en-US" smtClean="0"/>
-              <a:t>8/19/2012</a:t>
+              <a:t>8/22/2012</a:t>
             </a:fld>
             <a:endParaRPr lang="en-US"/>
           </a:p>
@@ -3925,7 +3931,7 @@
           <a:p>
             <a:fld id="{A4F60FB3-6432-4A26-85B7-EC33EA63D569}" type="datetime1">
               <a:rPr lang="en-US" smtClean="0"/>
-              <a:t>8/19/2012</a:t>
+              <a:t>8/22/2012</a:t>
             </a:fld>
             <a:endParaRPr lang="en-US"/>
           </a:p>
@@ -31356,13 +31362,6 @@
               </a:rPr>
               <a:t>Code - Review</a:t>
             </a:r>
-            <a:endParaRPr lang="en-US" sz="4000" dirty="0" smtClean="0">
-              <a:solidFill>
-                <a:srgbClr val="FFC000"/>
-              </a:solidFill>
-              <a:latin typeface="Adobe Caslon Pro Bold" pitchFamily="18" charset="0"/>
-              <a:ea typeface="Adobe Fan Heiti Std B" pitchFamily="34" charset="-128"/>
-            </a:endParaRPr>
           </a:p>
         </p:txBody>
       </p:sp>
@@ -34944,6 +34943,536 @@
 </p:sld>
 </file>
 
+<file path=ppt/slides/slide38.xml><?xml version="1.0" encoding="utf-8"?>
+<p:sld xmlns:a="http://schemas.openxmlformats.org/drawingml/2006/main" xmlns:r="http://schemas.openxmlformats.org/officeDocument/2006/relationships" xmlns:p="http://schemas.openxmlformats.org/presentationml/2006/main">
+  <p:cSld>
+    <p:spTree>
+      <p:nvGrpSpPr>
+        <p:cNvPr id="1" name=""/>
+        <p:cNvGrpSpPr/>
+        <p:nvPr/>
+      </p:nvGrpSpPr>
+      <p:grpSpPr>
+        <a:xfrm>
+          <a:off x="0" y="0"/>
+          <a:ext cx="0" cy="0"/>
+          <a:chOff x="0" y="0"/>
+          <a:chExt cx="0" cy="0"/>
+        </a:xfrm>
+      </p:grpSpPr>
+      <p:sp>
+        <p:nvSpPr>
+          <p:cNvPr id="7" name="Content Placeholder 6"/>
+          <p:cNvSpPr>
+            <a:spLocks noGrp="1"/>
+          </p:cNvSpPr>
+          <p:nvPr>
+            <p:ph sz="half" idx="1"/>
+          </p:nvPr>
+        </p:nvSpPr>
+        <p:spPr>
+          <a:xfrm>
+            <a:off x="457200" y="1371600"/>
+            <a:ext cx="7620000" cy="4983325"/>
+          </a:xfrm>
+        </p:spPr>
+        <p:txBody>
+          <a:bodyPr>
+            <a:normAutofit fontScale="92500" lnSpcReduction="10000"/>
+          </a:bodyPr>
+          <a:lstStyle/>
+          <a:p>
+            <a:r>
+              <a:rPr lang="en-US" b="1" dirty="0" smtClean="0"/>
+              <a:t>Features : support PM in management the budget and expense of the project. Help them make a suitable plan to stay in budget until the end of the project.</a:t>
+            </a:r>
+          </a:p>
+          <a:p>
+            <a:r>
+              <a:rPr lang="en-US" b="1" dirty="0" smtClean="0"/>
+              <a:t>The Cost Management include :</a:t>
+            </a:r>
+          </a:p>
+          <a:p>
+            <a:pPr marL="0" indent="0">
+              <a:buNone/>
+            </a:pPr>
+            <a:r>
+              <a:rPr lang="en-US" b="1" dirty="0" smtClean="0"/>
+              <a:t>    - Budget</a:t>
+            </a:r>
+          </a:p>
+          <a:p>
+            <a:pPr marL="0" indent="0">
+              <a:buNone/>
+            </a:pPr>
+            <a:r>
+              <a:rPr lang="en-US" b="1" dirty="0"/>
+              <a:t> </a:t>
+            </a:r>
+            <a:r>
+              <a:rPr lang="en-US" b="1" dirty="0" smtClean="0"/>
+              <a:t>   - Invoice</a:t>
+            </a:r>
+          </a:p>
+          <a:p>
+            <a:pPr marL="0" indent="0">
+              <a:buNone/>
+            </a:pPr>
+            <a:r>
+              <a:rPr lang="en-US" b="1" dirty="0"/>
+              <a:t> </a:t>
+            </a:r>
+            <a:r>
+              <a:rPr lang="en-US" b="1" dirty="0" smtClean="0"/>
+              <a:t>   - Planner </a:t>
+            </a:r>
+          </a:p>
+          <a:p>
+            <a:pPr marL="0" indent="0">
+              <a:buNone/>
+            </a:pPr>
+            <a:r>
+              <a:rPr lang="en-US" b="1" dirty="0"/>
+              <a:t> </a:t>
+            </a:r>
+            <a:r>
+              <a:rPr lang="en-US" b="1" dirty="0" smtClean="0"/>
+              <a:t>      + One Time Expense</a:t>
+            </a:r>
+          </a:p>
+          <a:p>
+            <a:pPr marL="0" indent="0">
+              <a:buNone/>
+            </a:pPr>
+            <a:r>
+              <a:rPr lang="en-US" b="1" dirty="0"/>
+              <a:t> </a:t>
+            </a:r>
+            <a:r>
+              <a:rPr lang="en-US" b="1" dirty="0" smtClean="0"/>
+              <a:t>      + Daily Expense</a:t>
+            </a:r>
+            <a:endParaRPr lang="en-US" dirty="0"/>
+          </a:p>
+          <a:p>
+            <a:pPr marL="0" indent="0">
+              <a:buNone/>
+            </a:pPr>
+            <a:r>
+              <a:rPr lang="en-US" dirty="0" smtClean="0"/>
+              <a:t>    </a:t>
+            </a:r>
+            <a:r>
+              <a:rPr lang="en-US" b="1" dirty="0"/>
+              <a:t> </a:t>
+            </a:r>
+            <a:r>
+              <a:rPr lang="en-US" b="1" dirty="0" smtClean="0"/>
+              <a:t>  + </a:t>
+            </a:r>
+            <a:r>
+              <a:rPr lang="en-US" b="1" dirty="0" smtClean="0"/>
+              <a:t>Exceptional Expense, Exceptional Deduct</a:t>
+            </a:r>
+          </a:p>
+          <a:p>
+            <a:pPr marL="0" indent="0">
+              <a:buNone/>
+            </a:pPr>
+            <a:r>
+              <a:rPr lang="en-US" b="1" dirty="0"/>
+              <a:t> </a:t>
+            </a:r>
+            <a:r>
+              <a:rPr lang="en-US" b="1" dirty="0" smtClean="0"/>
+              <a:t>      + Type</a:t>
+            </a:r>
+            <a:endParaRPr lang="en-US" dirty="0"/>
+          </a:p>
+          <a:p>
+            <a:pPr marL="0" indent="0">
+              <a:buNone/>
+            </a:pPr>
+            <a:endParaRPr lang="en-US" dirty="0"/>
+          </a:p>
+        </p:txBody>
+      </p:sp>
+      <p:sp>
+        <p:nvSpPr>
+          <p:cNvPr id="4" name="Slide Number Placeholder 3"/>
+          <p:cNvSpPr>
+            <a:spLocks noGrp="1"/>
+          </p:cNvSpPr>
+          <p:nvPr>
+            <p:ph type="sldNum" sz="quarter" idx="12"/>
+          </p:nvPr>
+        </p:nvSpPr>
+        <p:spPr/>
+        <p:txBody>
+          <a:bodyPr/>
+          <a:lstStyle/>
+          <a:p>
+            <a:fld id="{B6F15528-21DE-4FAA-801E-634DDDAF4B2B}" type="slidenum">
+              <a:rPr lang="en-US" smtClean="0"/>
+              <a:pPr/>
+              <a:t>38</a:t>
+            </a:fld>
+            <a:endParaRPr lang="en-US"/>
+          </a:p>
+        </p:txBody>
+      </p:sp>
+      <p:sp>
+        <p:nvSpPr>
+          <p:cNvPr id="5" name="TextBox 4"/>
+          <p:cNvSpPr txBox="1"/>
+          <p:nvPr/>
+        </p:nvSpPr>
+        <p:spPr>
+          <a:xfrm>
+            <a:off x="76200" y="152400"/>
+            <a:ext cx="8382000" cy="707886"/>
+          </a:xfrm>
+          <a:prstGeom prst="rect">
+            <a:avLst/>
+          </a:prstGeom>
+          <a:noFill/>
+        </p:spPr>
+        <p:txBody>
+          <a:bodyPr wrap="square" rtlCol="0">
+            <a:spAutoFit/>
+          </a:bodyPr>
+          <a:lstStyle/>
+          <a:p>
+            <a:r>
+              <a:rPr lang="en-US" sz="4000" dirty="0" smtClean="0">
+                <a:solidFill>
+                  <a:srgbClr val="FFC000"/>
+                </a:solidFill>
+                <a:latin typeface="Adobe Caslon Pro Bold" pitchFamily="18" charset="0"/>
+                <a:ea typeface="Adobe Fan Heiti Std B" pitchFamily="34" charset="-128"/>
+              </a:rPr>
+              <a:t>Cost Management</a:t>
+            </a:r>
+            <a:endParaRPr lang="en-US" sz="4000" dirty="0" smtClean="0">
+              <a:solidFill>
+                <a:srgbClr val="FFC000"/>
+              </a:solidFill>
+              <a:latin typeface="Adobe Caslon Pro Bold" pitchFamily="18" charset="0"/>
+              <a:ea typeface="Adobe Fan Heiti Std B" pitchFamily="34" charset="-128"/>
+            </a:endParaRPr>
+          </a:p>
+        </p:txBody>
+      </p:sp>
+      <p:sp>
+        <p:nvSpPr>
+          <p:cNvPr id="2" name="Footer Placeholder 1"/>
+          <p:cNvSpPr>
+            <a:spLocks noGrp="1"/>
+          </p:cNvSpPr>
+          <p:nvPr>
+            <p:ph type="ftr" sz="quarter" idx="11"/>
+          </p:nvPr>
+        </p:nvSpPr>
+        <p:spPr/>
+        <p:txBody>
+          <a:bodyPr/>
+          <a:lstStyle/>
+          <a:p>
+            <a:r>
+              <a:rPr lang="en-US" smtClean="0"/>
+              <a:t>OOPMS Team</a:t>
+            </a:r>
+            <a:endParaRPr lang="en-US"/>
+          </a:p>
+        </p:txBody>
+      </p:sp>
+    </p:spTree>
+    <p:extLst>
+      <p:ext uri="{BB962C8B-B14F-4D97-AF65-F5344CB8AC3E}">
+        <p14:creationId xmlns:p14="http://schemas.microsoft.com/office/powerpoint/2010/main" val="983895824"/>
+      </p:ext>
+    </p:extLst>
+  </p:cSld>
+  <p:clrMapOvr>
+    <a:masterClrMapping/>
+  </p:clrMapOvr>
+  <p:timing>
+    <p:tnLst>
+      <p:par>
+        <p:cTn id="1" dur="indefinite" restart="never" nodeType="tmRoot"/>
+      </p:par>
+    </p:tnLst>
+  </p:timing>
+</p:sld>
+</file>
+
+<file path=ppt/slides/slide39.xml><?xml version="1.0" encoding="utf-8"?>
+<p:sld xmlns:a="http://schemas.openxmlformats.org/drawingml/2006/main" xmlns:r="http://schemas.openxmlformats.org/officeDocument/2006/relationships" xmlns:p="http://schemas.openxmlformats.org/presentationml/2006/main">
+  <p:cSld>
+    <p:spTree>
+      <p:nvGrpSpPr>
+        <p:cNvPr id="1" name=""/>
+        <p:cNvGrpSpPr/>
+        <p:nvPr/>
+      </p:nvGrpSpPr>
+      <p:grpSpPr>
+        <a:xfrm>
+          <a:off x="0" y="0"/>
+          <a:ext cx="0" cy="0"/>
+          <a:chOff x="0" y="0"/>
+          <a:chExt cx="0" cy="0"/>
+        </a:xfrm>
+      </p:grpSpPr>
+      <p:sp>
+        <p:nvSpPr>
+          <p:cNvPr id="7" name="Content Placeholder 6"/>
+          <p:cNvSpPr>
+            <a:spLocks noGrp="1"/>
+          </p:cNvSpPr>
+          <p:nvPr>
+            <p:ph sz="half" idx="1"/>
+          </p:nvPr>
+        </p:nvSpPr>
+        <p:spPr>
+          <a:xfrm>
+            <a:off x="457200" y="1371601"/>
+            <a:ext cx="7620000" cy="990600"/>
+          </a:xfrm>
+        </p:spPr>
+        <p:txBody>
+          <a:bodyPr>
+            <a:normAutofit/>
+          </a:bodyPr>
+          <a:lstStyle/>
+          <a:p>
+            <a:r>
+              <a:rPr lang="en-US" b="1" dirty="0" smtClean="0"/>
+              <a:t>Features : allow PM to manage the budget of project. </a:t>
+            </a:r>
+            <a:r>
+              <a:rPr lang="en-US" b="1" dirty="0" smtClean="0"/>
+              <a:t>Keep the record of budget.</a:t>
+            </a:r>
+            <a:endParaRPr lang="en-US" b="1" dirty="0" smtClean="0"/>
+          </a:p>
+          <a:p>
+            <a:pPr marL="0" indent="0">
+              <a:buNone/>
+            </a:pPr>
+            <a:endParaRPr lang="en-US" dirty="0"/>
+          </a:p>
+        </p:txBody>
+      </p:sp>
+      <p:sp>
+        <p:nvSpPr>
+          <p:cNvPr id="4" name="Slide Number Placeholder 3"/>
+          <p:cNvSpPr>
+            <a:spLocks noGrp="1"/>
+          </p:cNvSpPr>
+          <p:nvPr>
+            <p:ph type="sldNum" sz="quarter" idx="12"/>
+          </p:nvPr>
+        </p:nvSpPr>
+        <p:spPr/>
+        <p:txBody>
+          <a:bodyPr/>
+          <a:lstStyle/>
+          <a:p>
+            <a:fld id="{B6F15528-21DE-4FAA-801E-634DDDAF4B2B}" type="slidenum">
+              <a:rPr lang="en-US" smtClean="0"/>
+              <a:pPr/>
+              <a:t>39</a:t>
+            </a:fld>
+            <a:endParaRPr lang="en-US"/>
+          </a:p>
+        </p:txBody>
+      </p:sp>
+      <p:sp>
+        <p:nvSpPr>
+          <p:cNvPr id="5" name="TextBox 4"/>
+          <p:cNvSpPr txBox="1"/>
+          <p:nvPr/>
+        </p:nvSpPr>
+        <p:spPr>
+          <a:xfrm>
+            <a:off x="76200" y="152400"/>
+            <a:ext cx="8382000" cy="707886"/>
+          </a:xfrm>
+          <a:prstGeom prst="rect">
+            <a:avLst/>
+          </a:prstGeom>
+          <a:noFill/>
+        </p:spPr>
+        <p:txBody>
+          <a:bodyPr wrap="square" rtlCol="0">
+            <a:spAutoFit/>
+          </a:bodyPr>
+          <a:lstStyle/>
+          <a:p>
+            <a:r>
+              <a:rPr lang="en-US" sz="4000" dirty="0" smtClean="0">
+                <a:solidFill>
+                  <a:srgbClr val="FFC000"/>
+                </a:solidFill>
+                <a:latin typeface="Adobe Caslon Pro Bold" pitchFamily="18" charset="0"/>
+                <a:ea typeface="Adobe Fan Heiti Std B" pitchFamily="34" charset="-128"/>
+              </a:rPr>
+              <a:t>Budget</a:t>
+            </a:r>
+            <a:endParaRPr lang="en-US" sz="4000" dirty="0" smtClean="0">
+              <a:solidFill>
+                <a:srgbClr val="FFC000"/>
+              </a:solidFill>
+              <a:latin typeface="Adobe Caslon Pro Bold" pitchFamily="18" charset="0"/>
+              <a:ea typeface="Adobe Fan Heiti Std B" pitchFamily="34" charset="-128"/>
+            </a:endParaRPr>
+          </a:p>
+        </p:txBody>
+      </p:sp>
+      <p:sp>
+        <p:nvSpPr>
+          <p:cNvPr id="2" name="Footer Placeholder 1"/>
+          <p:cNvSpPr>
+            <a:spLocks noGrp="1"/>
+          </p:cNvSpPr>
+          <p:nvPr>
+            <p:ph type="ftr" sz="quarter" idx="11"/>
+          </p:nvPr>
+        </p:nvSpPr>
+        <p:spPr/>
+        <p:txBody>
+          <a:bodyPr/>
+          <a:lstStyle/>
+          <a:p>
+            <a:r>
+              <a:rPr lang="en-US" smtClean="0"/>
+              <a:t>OOPMS Team</a:t>
+            </a:r>
+            <a:endParaRPr lang="en-US"/>
+          </a:p>
+        </p:txBody>
+      </p:sp>
+      <p:sp>
+        <p:nvSpPr>
+          <p:cNvPr id="6" name="TextBox 5"/>
+          <p:cNvSpPr txBox="1"/>
+          <p:nvPr/>
+        </p:nvSpPr>
+        <p:spPr>
+          <a:xfrm>
+            <a:off x="228600" y="2590800"/>
+            <a:ext cx="8382000" cy="707886"/>
+          </a:xfrm>
+          <a:prstGeom prst="rect">
+            <a:avLst/>
+          </a:prstGeom>
+          <a:noFill/>
+        </p:spPr>
+        <p:txBody>
+          <a:bodyPr wrap="square" rtlCol="0">
+            <a:spAutoFit/>
+          </a:bodyPr>
+          <a:lstStyle/>
+          <a:p>
+            <a:r>
+              <a:rPr lang="en-US" sz="4000" dirty="0" smtClean="0">
+                <a:solidFill>
+                  <a:srgbClr val="FFC000"/>
+                </a:solidFill>
+                <a:latin typeface="Adobe Caslon Pro Bold" pitchFamily="18" charset="0"/>
+                <a:ea typeface="Adobe Fan Heiti Std B" pitchFamily="34" charset="-128"/>
+              </a:rPr>
+              <a:t>Invoice</a:t>
+            </a:r>
+            <a:endParaRPr lang="en-US" sz="4000" dirty="0" smtClean="0">
+              <a:solidFill>
+                <a:srgbClr val="FFC000"/>
+              </a:solidFill>
+              <a:latin typeface="Adobe Caslon Pro Bold" pitchFamily="18" charset="0"/>
+              <a:ea typeface="Adobe Fan Heiti Std B" pitchFamily="34" charset="-128"/>
+            </a:endParaRPr>
+          </a:p>
+        </p:txBody>
+      </p:sp>
+      <p:sp>
+        <p:nvSpPr>
+          <p:cNvPr id="8" name="Content Placeholder 6"/>
+          <p:cNvSpPr>
+            <a:spLocks noGrp="1"/>
+          </p:cNvSpPr>
+          <p:nvPr>
+            <p:ph sz="half" idx="1"/>
+          </p:nvPr>
+        </p:nvSpPr>
+        <p:spPr>
+          <a:xfrm>
+            <a:off x="609600" y="3298686"/>
+            <a:ext cx="7620000" cy="2797314"/>
+          </a:xfrm>
+        </p:spPr>
+        <p:txBody>
+          <a:bodyPr>
+            <a:normAutofit/>
+          </a:bodyPr>
+          <a:lstStyle/>
+          <a:p>
+            <a:r>
+              <a:rPr lang="en-US" b="1" dirty="0" smtClean="0"/>
+              <a:t>Features : </a:t>
+            </a:r>
+          </a:p>
+          <a:p>
+            <a:pPr marL="0" indent="0">
+              <a:buNone/>
+            </a:pPr>
+            <a:r>
+              <a:rPr lang="en-US" b="1" dirty="0" smtClean="0"/>
+              <a:t>   - PM can see how much money are actually paid. Keep the record of invoice.</a:t>
+            </a:r>
+          </a:p>
+          <a:p>
+            <a:pPr marL="0" indent="0">
+              <a:buNone/>
+            </a:pPr>
+            <a:r>
+              <a:rPr lang="en-US" b="1" dirty="0"/>
+              <a:t> </a:t>
+            </a:r>
+            <a:r>
+              <a:rPr lang="en-US" b="1" dirty="0" smtClean="0"/>
+              <a:t>  - Export the invoice report to excel.</a:t>
+            </a:r>
+            <a:endParaRPr lang="en-US" b="1" dirty="0" smtClean="0"/>
+          </a:p>
+          <a:p>
+            <a:pPr marL="0" indent="0">
+              <a:buNone/>
+            </a:pPr>
+            <a:endParaRPr lang="en-US" dirty="0"/>
+          </a:p>
+        </p:txBody>
+      </p:sp>
+    </p:spTree>
+    <p:extLst>
+      <p:ext uri="{BB962C8B-B14F-4D97-AF65-F5344CB8AC3E}">
+        <p14:creationId xmlns:p14="http://schemas.microsoft.com/office/powerpoint/2010/main" val="2818217522"/>
+      </p:ext>
+    </p:extLst>
+  </p:cSld>
+  <p:clrMapOvr>
+    <a:masterClrMapping/>
+  </p:clrMapOvr>
+  <p:timing>
+    <p:tnLst>
+      <p:par>
+        <p:cTn id="1" dur="indefinite" restart="never" nodeType="tmRoot"/>
+      </p:par>
+    </p:tnLst>
+  </p:timing>
+</p:sld>
+</file>
+
 <file path=ppt/slides/slide4.xml><?xml version="1.0" encoding="utf-8"?>
 <p:sld xmlns:a="http://schemas.openxmlformats.org/drawingml/2006/main" xmlns:r="http://schemas.openxmlformats.org/officeDocument/2006/relationships" xmlns:p="http://schemas.openxmlformats.org/presentationml/2006/main">
   <p:cSld>
@@ -35465,6 +35994,776 @@
       </p:transition>
     </mc:Fallback>
   </mc:AlternateContent>
+  <p:timing>
+    <p:tnLst>
+      <p:par>
+        <p:cTn id="1" dur="indefinite" restart="never" nodeType="tmRoot"/>
+      </p:par>
+    </p:tnLst>
+  </p:timing>
+</p:sld>
+</file>
+
+<file path=ppt/slides/slide40.xml><?xml version="1.0" encoding="utf-8"?>
+<p:sld xmlns:a="http://schemas.openxmlformats.org/drawingml/2006/main" xmlns:r="http://schemas.openxmlformats.org/officeDocument/2006/relationships" xmlns:p="http://schemas.openxmlformats.org/presentationml/2006/main">
+  <p:cSld>
+    <p:spTree>
+      <p:nvGrpSpPr>
+        <p:cNvPr id="1" name=""/>
+        <p:cNvGrpSpPr/>
+        <p:nvPr/>
+      </p:nvGrpSpPr>
+      <p:grpSpPr>
+        <a:xfrm>
+          <a:off x="0" y="0"/>
+          <a:ext cx="0" cy="0"/>
+          <a:chOff x="0" y="0"/>
+          <a:chExt cx="0" cy="0"/>
+        </a:xfrm>
+      </p:grpSpPr>
+      <p:sp>
+        <p:nvSpPr>
+          <p:cNvPr id="7" name="Content Placeholder 6"/>
+          <p:cNvSpPr>
+            <a:spLocks noGrp="1"/>
+          </p:cNvSpPr>
+          <p:nvPr>
+            <p:ph sz="half" idx="1"/>
+          </p:nvPr>
+        </p:nvSpPr>
+        <p:spPr>
+          <a:xfrm>
+            <a:off x="457200" y="1371600"/>
+            <a:ext cx="7620000" cy="4800599"/>
+          </a:xfrm>
+        </p:spPr>
+        <p:txBody>
+          <a:bodyPr>
+            <a:normAutofit/>
+          </a:bodyPr>
+          <a:lstStyle/>
+          <a:p>
+            <a:r>
+              <a:rPr lang="en-US" b="1" dirty="0" smtClean="0"/>
+              <a:t>Features : </a:t>
+            </a:r>
+          </a:p>
+          <a:p>
+            <a:pPr marL="0" indent="0">
+              <a:buNone/>
+            </a:pPr>
+            <a:r>
+              <a:rPr lang="en-US" b="1" dirty="0"/>
+              <a:t> </a:t>
+            </a:r>
+            <a:r>
+              <a:rPr lang="en-US" b="1" dirty="0" smtClean="0"/>
+              <a:t> - </a:t>
+            </a:r>
+            <a:r>
+              <a:rPr lang="en-US" b="1" dirty="0" smtClean="0"/>
+              <a:t>Manage the expense that happen once in the project. (money use to buy equipment, pay bill, …</a:t>
+            </a:r>
+            <a:r>
+              <a:rPr lang="en-US" b="1" dirty="0" err="1" smtClean="0"/>
+              <a:t>v.v</a:t>
+            </a:r>
+            <a:r>
+              <a:rPr lang="en-US" b="1" dirty="0" smtClean="0"/>
+              <a:t>)</a:t>
+            </a:r>
+          </a:p>
+          <a:p>
+            <a:pPr marL="0" indent="0">
+              <a:buNone/>
+            </a:pPr>
+            <a:r>
+              <a:rPr lang="en-US" b="1" dirty="0"/>
+              <a:t>  </a:t>
+            </a:r>
+            <a:r>
+              <a:rPr lang="en-US" b="1" dirty="0" smtClean="0"/>
+              <a:t>- Have pay function to send the expense to invoice.</a:t>
+            </a:r>
+            <a:endParaRPr lang="en-US" b="1" dirty="0" smtClean="0"/>
+          </a:p>
+          <a:p>
+            <a:pPr marL="0" indent="0">
+              <a:buNone/>
+            </a:pPr>
+            <a:endParaRPr lang="en-US" dirty="0"/>
+          </a:p>
+        </p:txBody>
+      </p:sp>
+      <p:sp>
+        <p:nvSpPr>
+          <p:cNvPr id="4" name="Slide Number Placeholder 3"/>
+          <p:cNvSpPr>
+            <a:spLocks noGrp="1"/>
+          </p:cNvSpPr>
+          <p:nvPr>
+            <p:ph type="sldNum" sz="quarter" idx="12"/>
+          </p:nvPr>
+        </p:nvSpPr>
+        <p:spPr/>
+        <p:txBody>
+          <a:bodyPr/>
+          <a:lstStyle/>
+          <a:p>
+            <a:fld id="{B6F15528-21DE-4FAA-801E-634DDDAF4B2B}" type="slidenum">
+              <a:rPr lang="en-US" smtClean="0"/>
+              <a:pPr/>
+              <a:t>40</a:t>
+            </a:fld>
+            <a:endParaRPr lang="en-US"/>
+          </a:p>
+        </p:txBody>
+      </p:sp>
+      <p:sp>
+        <p:nvSpPr>
+          <p:cNvPr id="5" name="TextBox 4"/>
+          <p:cNvSpPr txBox="1"/>
+          <p:nvPr/>
+        </p:nvSpPr>
+        <p:spPr>
+          <a:xfrm>
+            <a:off x="76200" y="152400"/>
+            <a:ext cx="8382000" cy="707886"/>
+          </a:xfrm>
+          <a:prstGeom prst="rect">
+            <a:avLst/>
+          </a:prstGeom>
+          <a:noFill/>
+        </p:spPr>
+        <p:txBody>
+          <a:bodyPr wrap="square" rtlCol="0">
+            <a:spAutoFit/>
+          </a:bodyPr>
+          <a:lstStyle/>
+          <a:p>
+            <a:r>
+              <a:rPr lang="en-US" sz="4000" dirty="0" smtClean="0">
+                <a:solidFill>
+                  <a:srgbClr val="FFC000"/>
+                </a:solidFill>
+                <a:latin typeface="Adobe Caslon Pro Bold" pitchFamily="18" charset="0"/>
+                <a:ea typeface="Adobe Fan Heiti Std B" pitchFamily="34" charset="-128"/>
+              </a:rPr>
+              <a:t>One Time Expense</a:t>
+            </a:r>
+            <a:endParaRPr lang="en-US" sz="4000" dirty="0" smtClean="0">
+              <a:solidFill>
+                <a:srgbClr val="FFC000"/>
+              </a:solidFill>
+              <a:latin typeface="Adobe Caslon Pro Bold" pitchFamily="18" charset="0"/>
+              <a:ea typeface="Adobe Fan Heiti Std B" pitchFamily="34" charset="-128"/>
+            </a:endParaRPr>
+          </a:p>
+        </p:txBody>
+      </p:sp>
+      <p:sp>
+        <p:nvSpPr>
+          <p:cNvPr id="2" name="Footer Placeholder 1"/>
+          <p:cNvSpPr>
+            <a:spLocks noGrp="1"/>
+          </p:cNvSpPr>
+          <p:nvPr>
+            <p:ph type="ftr" sz="quarter" idx="11"/>
+          </p:nvPr>
+        </p:nvSpPr>
+        <p:spPr/>
+        <p:txBody>
+          <a:bodyPr/>
+          <a:lstStyle/>
+          <a:p>
+            <a:r>
+              <a:rPr lang="en-US" smtClean="0"/>
+              <a:t>OOPMS Team</a:t>
+            </a:r>
+            <a:endParaRPr lang="en-US"/>
+          </a:p>
+        </p:txBody>
+      </p:sp>
+    </p:spTree>
+    <p:extLst>
+      <p:ext uri="{BB962C8B-B14F-4D97-AF65-F5344CB8AC3E}">
+        <p14:creationId xmlns:p14="http://schemas.microsoft.com/office/powerpoint/2010/main" val="1073835205"/>
+      </p:ext>
+    </p:extLst>
+  </p:cSld>
+  <p:clrMapOvr>
+    <a:masterClrMapping/>
+  </p:clrMapOvr>
+  <p:timing>
+    <p:tnLst>
+      <p:par>
+        <p:cTn id="1" dur="indefinite" restart="never" nodeType="tmRoot"/>
+      </p:par>
+    </p:tnLst>
+  </p:timing>
+</p:sld>
+</file>
+
+<file path=ppt/slides/slide41.xml><?xml version="1.0" encoding="utf-8"?>
+<p:sld xmlns:a="http://schemas.openxmlformats.org/drawingml/2006/main" xmlns:r="http://schemas.openxmlformats.org/officeDocument/2006/relationships" xmlns:p="http://schemas.openxmlformats.org/presentationml/2006/main">
+  <p:cSld>
+    <p:spTree>
+      <p:nvGrpSpPr>
+        <p:cNvPr id="1" name=""/>
+        <p:cNvGrpSpPr/>
+        <p:nvPr/>
+      </p:nvGrpSpPr>
+      <p:grpSpPr>
+        <a:xfrm>
+          <a:off x="0" y="0"/>
+          <a:ext cx="0" cy="0"/>
+          <a:chOff x="0" y="0"/>
+          <a:chExt cx="0" cy="0"/>
+        </a:xfrm>
+      </p:grpSpPr>
+      <p:sp>
+        <p:nvSpPr>
+          <p:cNvPr id="7" name="Content Placeholder 6"/>
+          <p:cNvSpPr>
+            <a:spLocks noGrp="1"/>
+          </p:cNvSpPr>
+          <p:nvPr>
+            <p:ph sz="half" idx="1"/>
+          </p:nvPr>
+        </p:nvSpPr>
+        <p:spPr>
+          <a:xfrm>
+            <a:off x="457200" y="1371600"/>
+            <a:ext cx="7620000" cy="4800599"/>
+          </a:xfrm>
+        </p:spPr>
+        <p:txBody>
+          <a:bodyPr>
+            <a:normAutofit/>
+          </a:bodyPr>
+          <a:lstStyle/>
+          <a:p>
+            <a:r>
+              <a:rPr lang="en-US" b="1" dirty="0" smtClean="0"/>
+              <a:t>Features : </a:t>
+            </a:r>
+          </a:p>
+          <a:p>
+            <a:pPr marL="0" indent="0">
+              <a:buNone/>
+            </a:pPr>
+            <a:r>
+              <a:rPr lang="en-US" b="1" dirty="0"/>
+              <a:t> </a:t>
+            </a:r>
+            <a:r>
+              <a:rPr lang="en-US" b="1" dirty="0" smtClean="0"/>
+              <a:t> - </a:t>
+            </a:r>
+            <a:r>
+              <a:rPr lang="en-US" b="1" dirty="0" smtClean="0"/>
+              <a:t>Manage the expense that keeping happen in a duration of time. (money use to pay for salary )</a:t>
+            </a:r>
+          </a:p>
+          <a:p>
+            <a:pPr marL="0" indent="0">
+              <a:buNone/>
+            </a:pPr>
+            <a:r>
+              <a:rPr lang="en-US" b="1" dirty="0"/>
+              <a:t>  </a:t>
+            </a:r>
+            <a:r>
+              <a:rPr lang="en-US" b="1" dirty="0" smtClean="0"/>
+              <a:t>- Have pay function to send the expense to invoice.</a:t>
+            </a:r>
+            <a:endParaRPr lang="en-US" b="1" dirty="0" smtClean="0"/>
+          </a:p>
+          <a:p>
+            <a:pPr marL="0" indent="0">
+              <a:buNone/>
+            </a:pPr>
+            <a:endParaRPr lang="en-US" dirty="0"/>
+          </a:p>
+        </p:txBody>
+      </p:sp>
+      <p:sp>
+        <p:nvSpPr>
+          <p:cNvPr id="4" name="Slide Number Placeholder 3"/>
+          <p:cNvSpPr>
+            <a:spLocks noGrp="1"/>
+          </p:cNvSpPr>
+          <p:nvPr>
+            <p:ph type="sldNum" sz="quarter" idx="12"/>
+          </p:nvPr>
+        </p:nvSpPr>
+        <p:spPr/>
+        <p:txBody>
+          <a:bodyPr/>
+          <a:lstStyle/>
+          <a:p>
+            <a:fld id="{B6F15528-21DE-4FAA-801E-634DDDAF4B2B}" type="slidenum">
+              <a:rPr lang="en-US" smtClean="0"/>
+              <a:pPr/>
+              <a:t>41</a:t>
+            </a:fld>
+            <a:endParaRPr lang="en-US"/>
+          </a:p>
+        </p:txBody>
+      </p:sp>
+      <p:sp>
+        <p:nvSpPr>
+          <p:cNvPr id="5" name="TextBox 4"/>
+          <p:cNvSpPr txBox="1"/>
+          <p:nvPr/>
+        </p:nvSpPr>
+        <p:spPr>
+          <a:xfrm>
+            <a:off x="76200" y="152400"/>
+            <a:ext cx="8382000" cy="707886"/>
+          </a:xfrm>
+          <a:prstGeom prst="rect">
+            <a:avLst/>
+          </a:prstGeom>
+          <a:noFill/>
+        </p:spPr>
+        <p:txBody>
+          <a:bodyPr wrap="square" rtlCol="0">
+            <a:spAutoFit/>
+          </a:bodyPr>
+          <a:lstStyle/>
+          <a:p>
+            <a:r>
+              <a:rPr lang="en-US" sz="4000" dirty="0" smtClean="0">
+                <a:solidFill>
+                  <a:srgbClr val="FFC000"/>
+                </a:solidFill>
+                <a:latin typeface="Adobe Caslon Pro Bold" pitchFamily="18" charset="0"/>
+                <a:ea typeface="Adobe Fan Heiti Std B" pitchFamily="34" charset="-128"/>
+              </a:rPr>
+              <a:t>Daily Expense</a:t>
+            </a:r>
+            <a:endParaRPr lang="en-US" sz="4000" dirty="0" smtClean="0">
+              <a:solidFill>
+                <a:srgbClr val="FFC000"/>
+              </a:solidFill>
+              <a:latin typeface="Adobe Caslon Pro Bold" pitchFamily="18" charset="0"/>
+              <a:ea typeface="Adobe Fan Heiti Std B" pitchFamily="34" charset="-128"/>
+            </a:endParaRPr>
+          </a:p>
+        </p:txBody>
+      </p:sp>
+      <p:sp>
+        <p:nvSpPr>
+          <p:cNvPr id="2" name="Footer Placeholder 1"/>
+          <p:cNvSpPr>
+            <a:spLocks noGrp="1"/>
+          </p:cNvSpPr>
+          <p:nvPr>
+            <p:ph type="ftr" sz="quarter" idx="11"/>
+          </p:nvPr>
+        </p:nvSpPr>
+        <p:spPr/>
+        <p:txBody>
+          <a:bodyPr/>
+          <a:lstStyle/>
+          <a:p>
+            <a:r>
+              <a:rPr lang="en-US" smtClean="0"/>
+              <a:t>OOPMS Team</a:t>
+            </a:r>
+            <a:endParaRPr lang="en-US"/>
+          </a:p>
+        </p:txBody>
+      </p:sp>
+    </p:spTree>
+    <p:extLst>
+      <p:ext uri="{BB962C8B-B14F-4D97-AF65-F5344CB8AC3E}">
+        <p14:creationId xmlns:p14="http://schemas.microsoft.com/office/powerpoint/2010/main" val="1497829545"/>
+      </p:ext>
+    </p:extLst>
+  </p:cSld>
+  <p:clrMapOvr>
+    <a:masterClrMapping/>
+  </p:clrMapOvr>
+  <p:timing>
+    <p:tnLst>
+      <p:par>
+        <p:cTn id="1" dur="indefinite" restart="never" nodeType="tmRoot"/>
+      </p:par>
+    </p:tnLst>
+  </p:timing>
+</p:sld>
+</file>
+
+<file path=ppt/slides/slide42.xml><?xml version="1.0" encoding="utf-8"?>
+<p:sld xmlns:a="http://schemas.openxmlformats.org/drawingml/2006/main" xmlns:r="http://schemas.openxmlformats.org/officeDocument/2006/relationships" xmlns:p="http://schemas.openxmlformats.org/presentationml/2006/main">
+  <p:cSld>
+    <p:spTree>
+      <p:nvGrpSpPr>
+        <p:cNvPr id="1" name=""/>
+        <p:cNvGrpSpPr/>
+        <p:nvPr/>
+      </p:nvGrpSpPr>
+      <p:grpSpPr>
+        <a:xfrm>
+          <a:off x="0" y="0"/>
+          <a:ext cx="0" cy="0"/>
+          <a:chOff x="0" y="0"/>
+          <a:chExt cx="0" cy="0"/>
+        </a:xfrm>
+      </p:grpSpPr>
+      <p:sp>
+        <p:nvSpPr>
+          <p:cNvPr id="7" name="Content Placeholder 6"/>
+          <p:cNvSpPr>
+            <a:spLocks noGrp="1"/>
+          </p:cNvSpPr>
+          <p:nvPr>
+            <p:ph sz="half" idx="1"/>
+          </p:nvPr>
+        </p:nvSpPr>
+        <p:spPr>
+          <a:xfrm>
+            <a:off x="457200" y="1371600"/>
+            <a:ext cx="7620000" cy="4800599"/>
+          </a:xfrm>
+        </p:spPr>
+        <p:txBody>
+          <a:bodyPr>
+            <a:normAutofit/>
+          </a:bodyPr>
+          <a:lstStyle/>
+          <a:p>
+            <a:r>
+              <a:rPr lang="en-US" b="1" dirty="0" smtClean="0"/>
+              <a:t>Features : </a:t>
+            </a:r>
+          </a:p>
+          <a:p>
+            <a:pPr marL="0" indent="0">
+              <a:buNone/>
+            </a:pPr>
+            <a:r>
+              <a:rPr lang="en-US" b="1" dirty="0"/>
+              <a:t> </a:t>
+            </a:r>
+            <a:r>
+              <a:rPr lang="en-US" b="1" dirty="0" smtClean="0"/>
+              <a:t> - </a:t>
+            </a:r>
+            <a:r>
+              <a:rPr lang="en-US" b="1" dirty="0" smtClean="0"/>
+              <a:t>Manage the expense that rarely appear (money to pay for working OT, bonus for employee, money receive from employee that take day off without salary, …</a:t>
+            </a:r>
+            <a:r>
+              <a:rPr lang="en-US" b="1" dirty="0" err="1" smtClean="0"/>
+              <a:t>v.v</a:t>
+            </a:r>
+            <a:r>
+              <a:rPr lang="en-US" b="1" dirty="0" smtClean="0"/>
+              <a:t>)</a:t>
+            </a:r>
+          </a:p>
+          <a:p>
+            <a:pPr marL="0" indent="0">
+              <a:buNone/>
+            </a:pPr>
+            <a:r>
+              <a:rPr lang="en-US" b="1" dirty="0"/>
+              <a:t>  </a:t>
+            </a:r>
+            <a:r>
+              <a:rPr lang="en-US" b="1" dirty="0" smtClean="0"/>
+              <a:t>- Have pay function to send the expense to invoice.</a:t>
+            </a:r>
+            <a:endParaRPr lang="en-US" b="1" dirty="0" smtClean="0"/>
+          </a:p>
+          <a:p>
+            <a:pPr marL="0" indent="0">
+              <a:buNone/>
+            </a:pPr>
+            <a:endParaRPr lang="en-US" dirty="0"/>
+          </a:p>
+        </p:txBody>
+      </p:sp>
+      <p:sp>
+        <p:nvSpPr>
+          <p:cNvPr id="4" name="Slide Number Placeholder 3"/>
+          <p:cNvSpPr>
+            <a:spLocks noGrp="1"/>
+          </p:cNvSpPr>
+          <p:nvPr>
+            <p:ph type="sldNum" sz="quarter" idx="12"/>
+          </p:nvPr>
+        </p:nvSpPr>
+        <p:spPr/>
+        <p:txBody>
+          <a:bodyPr/>
+          <a:lstStyle/>
+          <a:p>
+            <a:fld id="{B6F15528-21DE-4FAA-801E-634DDDAF4B2B}" type="slidenum">
+              <a:rPr lang="en-US" smtClean="0"/>
+              <a:pPr/>
+              <a:t>42</a:t>
+            </a:fld>
+            <a:endParaRPr lang="en-US"/>
+          </a:p>
+        </p:txBody>
+      </p:sp>
+      <p:sp>
+        <p:nvSpPr>
+          <p:cNvPr id="5" name="TextBox 4"/>
+          <p:cNvSpPr txBox="1"/>
+          <p:nvPr/>
+        </p:nvSpPr>
+        <p:spPr>
+          <a:xfrm>
+            <a:off x="76200" y="152400"/>
+            <a:ext cx="8382000" cy="707886"/>
+          </a:xfrm>
+          <a:prstGeom prst="rect">
+            <a:avLst/>
+          </a:prstGeom>
+          <a:noFill/>
+        </p:spPr>
+        <p:txBody>
+          <a:bodyPr wrap="square" rtlCol="0">
+            <a:spAutoFit/>
+          </a:bodyPr>
+          <a:lstStyle/>
+          <a:p>
+            <a:r>
+              <a:rPr lang="en-US" sz="4000" dirty="0" smtClean="0">
+                <a:solidFill>
+                  <a:srgbClr val="FFC000"/>
+                </a:solidFill>
+                <a:latin typeface="Adobe Caslon Pro Bold" pitchFamily="18" charset="0"/>
+                <a:ea typeface="Adobe Fan Heiti Std B" pitchFamily="34" charset="-128"/>
+              </a:rPr>
+              <a:t>Exceptional Expense/Deduct</a:t>
+            </a:r>
+            <a:endParaRPr lang="en-US" sz="4000" dirty="0" smtClean="0">
+              <a:solidFill>
+                <a:srgbClr val="FFC000"/>
+              </a:solidFill>
+              <a:latin typeface="Adobe Caslon Pro Bold" pitchFamily="18" charset="0"/>
+              <a:ea typeface="Adobe Fan Heiti Std B" pitchFamily="34" charset="-128"/>
+            </a:endParaRPr>
+          </a:p>
+        </p:txBody>
+      </p:sp>
+      <p:sp>
+        <p:nvSpPr>
+          <p:cNvPr id="2" name="Footer Placeholder 1"/>
+          <p:cNvSpPr>
+            <a:spLocks noGrp="1"/>
+          </p:cNvSpPr>
+          <p:nvPr>
+            <p:ph type="ftr" sz="quarter" idx="11"/>
+          </p:nvPr>
+        </p:nvSpPr>
+        <p:spPr/>
+        <p:txBody>
+          <a:bodyPr/>
+          <a:lstStyle/>
+          <a:p>
+            <a:r>
+              <a:rPr lang="en-US" smtClean="0"/>
+              <a:t>OOPMS Team</a:t>
+            </a:r>
+            <a:endParaRPr lang="en-US"/>
+          </a:p>
+        </p:txBody>
+      </p:sp>
+    </p:spTree>
+    <p:extLst>
+      <p:ext uri="{BB962C8B-B14F-4D97-AF65-F5344CB8AC3E}">
+        <p14:creationId xmlns:p14="http://schemas.microsoft.com/office/powerpoint/2010/main" val="1631004441"/>
+      </p:ext>
+    </p:extLst>
+  </p:cSld>
+  <p:clrMapOvr>
+    <a:masterClrMapping/>
+  </p:clrMapOvr>
+  <p:timing>
+    <p:tnLst>
+      <p:par>
+        <p:cTn id="1" dur="indefinite" restart="never" nodeType="tmRoot"/>
+      </p:par>
+    </p:tnLst>
+  </p:timing>
+</p:sld>
+</file>
+
+<file path=ppt/slides/slide43.xml><?xml version="1.0" encoding="utf-8"?>
+<p:sld xmlns:a="http://schemas.openxmlformats.org/drawingml/2006/main" xmlns:r="http://schemas.openxmlformats.org/officeDocument/2006/relationships" xmlns:p="http://schemas.openxmlformats.org/presentationml/2006/main">
+  <p:cSld>
+    <p:spTree>
+      <p:nvGrpSpPr>
+        <p:cNvPr id="1" name=""/>
+        <p:cNvGrpSpPr/>
+        <p:nvPr/>
+      </p:nvGrpSpPr>
+      <p:grpSpPr>
+        <a:xfrm>
+          <a:off x="0" y="0"/>
+          <a:ext cx="0" cy="0"/>
+          <a:chOff x="0" y="0"/>
+          <a:chExt cx="0" cy="0"/>
+        </a:xfrm>
+      </p:grpSpPr>
+      <p:sp>
+        <p:nvSpPr>
+          <p:cNvPr id="7" name="Content Placeholder 6"/>
+          <p:cNvSpPr>
+            <a:spLocks noGrp="1"/>
+          </p:cNvSpPr>
+          <p:nvPr>
+            <p:ph sz="half" idx="1"/>
+          </p:nvPr>
+        </p:nvSpPr>
+        <p:spPr>
+          <a:xfrm>
+            <a:off x="457200" y="1371601"/>
+            <a:ext cx="7620000" cy="2057400"/>
+          </a:xfrm>
+        </p:spPr>
+        <p:txBody>
+          <a:bodyPr>
+            <a:normAutofit/>
+          </a:bodyPr>
+          <a:lstStyle/>
+          <a:p>
+            <a:r>
+              <a:rPr lang="en-US" b="1" dirty="0" smtClean="0"/>
+              <a:t>Features : </a:t>
+            </a:r>
+          </a:p>
+          <a:p>
+            <a:pPr marL="0" indent="0">
+              <a:buNone/>
+            </a:pPr>
+            <a:r>
+              <a:rPr lang="en-US" b="1" dirty="0"/>
+              <a:t> </a:t>
+            </a:r>
+            <a:r>
+              <a:rPr lang="en-US" b="1" dirty="0" smtClean="0"/>
+              <a:t> - </a:t>
+            </a:r>
+            <a:r>
+              <a:rPr lang="en-US" b="1" dirty="0" smtClean="0"/>
+              <a:t>Grouping many daily expense into a type for easy adding record to exceptional expense or deduct.</a:t>
+            </a:r>
+          </a:p>
+          <a:p>
+            <a:pPr marL="0" indent="0">
+              <a:buNone/>
+            </a:pPr>
+            <a:endParaRPr lang="en-US" dirty="0"/>
+          </a:p>
+        </p:txBody>
+      </p:sp>
+      <p:sp>
+        <p:nvSpPr>
+          <p:cNvPr id="4" name="Slide Number Placeholder 3"/>
+          <p:cNvSpPr>
+            <a:spLocks noGrp="1"/>
+          </p:cNvSpPr>
+          <p:nvPr>
+            <p:ph type="sldNum" sz="quarter" idx="12"/>
+          </p:nvPr>
+        </p:nvSpPr>
+        <p:spPr/>
+        <p:txBody>
+          <a:bodyPr/>
+          <a:lstStyle/>
+          <a:p>
+            <a:fld id="{B6F15528-21DE-4FAA-801E-634DDDAF4B2B}" type="slidenum">
+              <a:rPr lang="en-US" smtClean="0"/>
+              <a:pPr/>
+              <a:t>43</a:t>
+            </a:fld>
+            <a:endParaRPr lang="en-US"/>
+          </a:p>
+        </p:txBody>
+      </p:sp>
+      <p:sp>
+        <p:nvSpPr>
+          <p:cNvPr id="5" name="TextBox 4"/>
+          <p:cNvSpPr txBox="1"/>
+          <p:nvPr/>
+        </p:nvSpPr>
+        <p:spPr>
+          <a:xfrm>
+            <a:off x="76200" y="152400"/>
+            <a:ext cx="8382000" cy="707886"/>
+          </a:xfrm>
+          <a:prstGeom prst="rect">
+            <a:avLst/>
+          </a:prstGeom>
+          <a:noFill/>
+        </p:spPr>
+        <p:txBody>
+          <a:bodyPr wrap="square" rtlCol="0">
+            <a:spAutoFit/>
+          </a:bodyPr>
+          <a:lstStyle/>
+          <a:p>
+            <a:r>
+              <a:rPr lang="en-US" sz="4000" dirty="0" smtClean="0">
+                <a:solidFill>
+                  <a:srgbClr val="FFC000"/>
+                </a:solidFill>
+                <a:latin typeface="Adobe Caslon Pro Bold" pitchFamily="18" charset="0"/>
+                <a:ea typeface="Adobe Fan Heiti Std B" pitchFamily="34" charset="-128"/>
+              </a:rPr>
+              <a:t>Type</a:t>
+            </a:r>
+            <a:endParaRPr lang="en-US" sz="4000" dirty="0" smtClean="0">
+              <a:solidFill>
+                <a:srgbClr val="FFC000"/>
+              </a:solidFill>
+              <a:latin typeface="Adobe Caslon Pro Bold" pitchFamily="18" charset="0"/>
+              <a:ea typeface="Adobe Fan Heiti Std B" pitchFamily="34" charset="-128"/>
+            </a:endParaRPr>
+          </a:p>
+        </p:txBody>
+      </p:sp>
+      <p:sp>
+        <p:nvSpPr>
+          <p:cNvPr id="2" name="Footer Placeholder 1"/>
+          <p:cNvSpPr>
+            <a:spLocks noGrp="1"/>
+          </p:cNvSpPr>
+          <p:nvPr>
+            <p:ph type="ftr" sz="quarter" idx="11"/>
+          </p:nvPr>
+        </p:nvSpPr>
+        <p:spPr/>
+        <p:txBody>
+          <a:bodyPr/>
+          <a:lstStyle/>
+          <a:p>
+            <a:r>
+              <a:rPr lang="en-US" smtClean="0"/>
+              <a:t>OOPMS Team</a:t>
+            </a:r>
+            <a:endParaRPr lang="en-US"/>
+          </a:p>
+        </p:txBody>
+      </p:sp>
+    </p:spTree>
+    <p:extLst>
+      <p:ext uri="{BB962C8B-B14F-4D97-AF65-F5344CB8AC3E}">
+        <p14:creationId xmlns:p14="http://schemas.microsoft.com/office/powerpoint/2010/main" val="1118118661"/>
+      </p:ext>
+    </p:extLst>
+  </p:cSld>
+  <p:clrMapOvr>
+    <a:masterClrMapping/>
+  </p:clrMapOvr>
   <p:timing>
     <p:tnLst>
       <p:par>

</xml_diff>